<commit_message>
updated ED slides again
</commit_message>
<xml_diff>
--- a/additional_scripts/ExperimentalDesignCourse_Edwards_19-11-2020.pptx
+++ b/additional_scripts/ExperimentalDesignCourse_Edwards_19-11-2020.pptx
@@ -7503,7 +7503,7 @@
           <a:p>
             <a:r>
               <a:rPr lang="en-US" sz="3600" dirty="0"/>
-              <a:t>Consider alternative explanations</a:t>
+              <a:t>Write it all down!!!!!!!!</a:t>
             </a:r>
           </a:p>
           <a:p>
@@ -7917,7 +7917,7 @@
           </a:lstStyle>
           <a:p>
             <a:r>
-              <a:rPr lang="en-US" sz="2600" b="1">
+              <a:rPr lang="en-US" sz="2600" b="1" dirty="0">
                 <a:latin typeface="Calibri"/>
                 <a:ea typeface="ＭＳ Ｐゴシック" charset="0"/>
                 <a:cs typeface="ＭＳ Ｐゴシック" charset="0"/>
@@ -7925,7 +7925,7 @@
               <a:t>Blocking</a:t>
             </a:r>
             <a:r>
-              <a:rPr lang="en-US" sz="2600">
+              <a:rPr lang="en-US" sz="2600" dirty="0">
                 <a:latin typeface="Calibri"/>
                 <a:ea typeface="ＭＳ Ｐゴシック" charset="0"/>
                 <a:cs typeface="ＭＳ Ｐゴシック" charset="0"/>
@@ -7933,7 +7933,7 @@
               <a:t> is the arranging of </a:t>
             </a:r>
             <a:r>
-              <a:rPr lang="en-US" sz="2600" i="1">
+              <a:rPr lang="en-US" sz="2600" i="1" dirty="0">
                 <a:latin typeface="Calibri"/>
                 <a:ea typeface="ＭＳ Ｐゴシック" charset="0"/>
                 <a:cs typeface="ＭＳ Ｐゴシック" charset="0"/>
@@ -7941,7 +7941,7 @@
               <a:t>experimental units </a:t>
             </a:r>
             <a:r>
-              <a:rPr lang="en-US" sz="2600">
+              <a:rPr lang="en-US" sz="2600" dirty="0">
                 <a:latin typeface="Calibri"/>
                 <a:ea typeface="ＭＳ Ｐゴシック" charset="0"/>
                 <a:cs typeface="ＭＳ Ｐゴシック" charset="0"/>
@@ -7955,7 +7955,7 @@
                 <a:spcPct val="40000"/>
               </a:lnSpc>
             </a:pPr>
-            <a:endParaRPr lang="en-US" sz="2900">
+            <a:endParaRPr lang="en-US" sz="2900" dirty="0">
               <a:latin typeface="Calibri"/>
               <a:ea typeface="ＭＳ Ｐゴシック" charset="0"/>
               <a:cs typeface="ＭＳ Ｐゴシック" charset="0"/>
@@ -7967,7 +7967,7 @@
                 <a:spcPct val="40000"/>
               </a:lnSpc>
             </a:pPr>
-            <a:endParaRPr lang="en-US" sz="2900">
+            <a:endParaRPr lang="en-US" sz="2900" dirty="0">
               <a:latin typeface="Calibri"/>
               <a:ea typeface="ＭＳ Ｐゴシック" charset="0"/>
               <a:cs typeface="ＭＳ Ｐゴシック" charset="0"/>
@@ -7979,7 +7979,7 @@
                 <a:spcPct val="40000"/>
               </a:lnSpc>
             </a:pPr>
-            <a:endParaRPr lang="en-US" sz="2900">
+            <a:endParaRPr lang="en-US" sz="2900" dirty="0">
               <a:latin typeface="Calibri"/>
               <a:ea typeface="ＭＳ Ｐゴシック" charset="0"/>
               <a:cs typeface="ＭＳ Ｐゴシック" charset="0"/>
@@ -7991,7 +7991,7 @@
                 <a:spcPct val="40000"/>
               </a:lnSpc>
             </a:pPr>
-            <a:endParaRPr lang="en-US" sz="2900">
+            <a:endParaRPr lang="en-US" sz="2900" dirty="0">
               <a:latin typeface="Calibri"/>
               <a:ea typeface="ＭＳ Ｐゴシック" charset="0"/>
               <a:cs typeface="ＭＳ Ｐゴシック" charset="0"/>
@@ -8003,7 +8003,7 @@
                 <a:spcPct val="40000"/>
               </a:lnSpc>
             </a:pPr>
-            <a:endParaRPr lang="en-US" sz="2900">
+            <a:endParaRPr lang="en-US" sz="2900" dirty="0">
               <a:latin typeface="Calibri"/>
               <a:ea typeface="ＭＳ Ｐゴシック" charset="0"/>
               <a:cs typeface="ＭＳ Ｐゴシック" charset="0"/>
@@ -8015,7 +8015,7 @@
                 <a:spcPct val="40000"/>
               </a:lnSpc>
             </a:pPr>
-            <a:endParaRPr lang="en-US" sz="2900">
+            <a:endParaRPr lang="en-US" sz="2900" dirty="0">
               <a:latin typeface="Calibri"/>
               <a:ea typeface="ＭＳ Ｐゴシック" charset="0"/>
               <a:cs typeface="ＭＳ Ｐゴシック" charset="0"/>
@@ -8027,49 +8027,49 @@
                 <a:spcPct val="40000"/>
               </a:lnSpc>
             </a:pPr>
-            <a:endParaRPr lang="en-US" sz="2900">
+            <a:endParaRPr lang="en-US" sz="2900" dirty="0">
               <a:latin typeface="Calibri"/>
               <a:ea typeface="ＭＳ Ｐゴシック" charset="0"/>
               <a:cs typeface="ＭＳ Ｐゴシック" charset="0"/>
             </a:endParaRPr>
           </a:p>
           <a:p>
-            <a:endParaRPr lang="en-US" sz="2900">
+            <a:endParaRPr lang="en-US" sz="2900" dirty="0">
               <a:latin typeface="Calibri"/>
               <a:ea typeface="ＭＳ Ｐゴシック" charset="0"/>
               <a:cs typeface="ＭＳ Ｐゴシック" charset="0"/>
             </a:endParaRPr>
           </a:p>
           <a:p>
-            <a:endParaRPr lang="en-US" sz="2900">
+            <a:endParaRPr lang="en-US" sz="2900" dirty="0">
               <a:latin typeface="Calibri"/>
               <a:ea typeface="ＭＳ Ｐゴシック" charset="0"/>
               <a:cs typeface="ＭＳ Ｐゴシック" charset="0"/>
             </a:endParaRPr>
           </a:p>
           <a:p>
-            <a:endParaRPr lang="en-US" sz="2600">
+            <a:endParaRPr lang="en-US" sz="2600" dirty="0">
               <a:latin typeface="Calibri"/>
               <a:ea typeface="ＭＳ Ｐゴシック" charset="0"/>
               <a:cs typeface="ＭＳ Ｐゴシック" charset="0"/>
             </a:endParaRPr>
           </a:p>
           <a:p>
-            <a:endParaRPr lang="en-US" sz="2600">
+            <a:endParaRPr lang="en-US" sz="2600" dirty="0">
               <a:latin typeface="Calibri"/>
               <a:ea typeface="ＭＳ Ｐゴシック" charset="0"/>
               <a:cs typeface="ＭＳ Ｐゴシック" charset="0"/>
             </a:endParaRPr>
           </a:p>
           <a:p>
-            <a:endParaRPr lang="en-US" sz="2600">
+            <a:endParaRPr lang="en-US" sz="2600" dirty="0">
               <a:latin typeface="Calibri"/>
               <a:ea typeface="ＭＳ Ｐゴシック" charset="0"/>
               <a:cs typeface="ＭＳ Ｐゴシック" charset="0"/>
             </a:endParaRPr>
           </a:p>
           <a:p>
-            <a:endParaRPr lang="en-US" sz="2600">
+            <a:endParaRPr lang="en-US" sz="2600" dirty="0">
               <a:latin typeface="Calibri"/>
               <a:ea typeface="ＭＳ Ｐゴシック" charset="0"/>
               <a:cs typeface="ＭＳ Ｐゴシック" charset="0"/>
@@ -8077,15 +8077,31 @@
           </a:p>
           <a:p>
             <a:r>
-              <a:rPr lang="en-US" sz="2600">
+              <a:rPr lang="en-US" sz="2600" dirty="0">
                 <a:latin typeface="Calibri"/>
                 <a:ea typeface="ＭＳ Ｐゴシック" charset="0"/>
                 <a:cs typeface="ＭＳ Ｐゴシック" charset="0"/>
               </a:rPr>
-              <a:t>RBD across plates so that each plate contains spatially randomised </a:t>
-            </a:r>
-            <a:r>
-              <a:rPr lang="en-US" sz="2600" b="1">
+              <a:t>Each plate contains spatially </a:t>
+            </a:r>
+            <a:r>
+              <a:rPr lang="en-US" sz="2600" dirty="0" err="1">
+                <a:latin typeface="Calibri"/>
+                <a:ea typeface="ＭＳ Ｐゴシック" charset="0"/>
+                <a:cs typeface="ＭＳ Ｐゴシック" charset="0"/>
+              </a:rPr>
+              <a:t>randomised</a:t>
+            </a:r>
+            <a:r>
+              <a:rPr lang="en-US" sz="2600" dirty="0">
+                <a:latin typeface="Calibri"/>
+                <a:ea typeface="ＭＳ Ｐゴシック" charset="0"/>
+                <a:cs typeface="ＭＳ Ｐゴシック" charset="0"/>
+              </a:rPr>
+              <a:t> </a:t>
+            </a:r>
+            <a:r>
+              <a:rPr lang="en-US" sz="2600" b="1" dirty="0">
                 <a:latin typeface="Calibri"/>
                 <a:ea typeface="ＭＳ Ｐゴシック" charset="0"/>
                 <a:cs typeface="ＭＳ Ｐゴシック" charset="0"/>
@@ -8093,7 +8109,7 @@
               <a:t>equal proportions</a:t>
             </a:r>
             <a:r>
-              <a:rPr lang="en-US" sz="2600">
+              <a:rPr lang="en-US" sz="2600" dirty="0">
                 <a:latin typeface="Calibri"/>
                 <a:ea typeface="ＭＳ Ｐゴシック" charset="0"/>
                 <a:cs typeface="ＭＳ Ｐゴシック" charset="0"/>
@@ -8108,7 +8124,7 @@
               </a:lnSpc>
             </a:pPr>
             <a:r>
-              <a:rPr lang="en-US" sz="2300">
+              <a:rPr lang="en-US" sz="2300" dirty="0">
                 <a:latin typeface="Calibri"/>
                 <a:ea typeface="ＭＳ Ｐゴシック" charset="0"/>
               </a:rPr>
@@ -8118,7 +8134,7 @@
           <a:p>
             <a:pPr lvl="2"/>
             <a:r>
-              <a:rPr lang="en-US" sz="2300">
+              <a:rPr lang="en-US" sz="2300" dirty="0">
                 <a:latin typeface="Calibri"/>
                 <a:ea typeface="ＭＳ Ｐゴシック" charset="0"/>
               </a:rPr>
@@ -8128,7 +8144,7 @@
           <a:p>
             <a:pPr lvl="2"/>
             <a:r>
-              <a:rPr lang="en-US" sz="2300">
+              <a:rPr lang="en-US" sz="2300" dirty="0">
                 <a:latin typeface="Calibri"/>
                 <a:ea typeface="ＭＳ Ｐゴシック" charset="0"/>
               </a:rPr>
@@ -8141,7 +8157,7 @@
               <a:buNone/>
             </a:pPr>
             <a:r>
-              <a:rPr lang="en-US" sz="2600">
+              <a:rPr lang="en-US" sz="2600" dirty="0">
                 <a:latin typeface="Calibri"/>
                 <a:ea typeface="ＭＳ Ｐゴシック" charset="0"/>
                 <a:cs typeface="ＭＳ Ｐゴシック" charset="0"/>
@@ -8149,7 +8165,7 @@
               <a:t>	controlling plate effects</a:t>
             </a:r>
             <a:r>
-              <a:rPr lang="en-US" sz="2900">
+              <a:rPr lang="en-US" sz="2900" dirty="0">
                 <a:latin typeface="Calibri"/>
                 <a:ea typeface="ＭＳ Ｐゴシック" charset="0"/>
                 <a:cs typeface="ＭＳ Ｐゴシック" charset="0"/>
@@ -14521,7 +14537,7 @@
         </p:nvSpPr>
         <p:spPr>
           <a:xfrm>
-            <a:off x="681038" y="1825625"/>
+            <a:off x="681038" y="1412776"/>
             <a:ext cx="8543925" cy="4351338"/>
           </a:xfrm>
           <a:prstGeom prst="rect">
@@ -14695,59 +14711,77 @@
             </a:lvl9pPr>
           </a:lstStyle>
           <a:p>
-            <a:r>
-              <a:rPr lang="en-US"/>
+            <a:pPr marL="0" indent="0">
+              <a:buNone/>
+            </a:pPr>
+            <a:r>
+              <a:rPr lang="en-US" dirty="0"/>
+              <a:t>Ideal : Everything is identical across conditions except the variable you are testing</a:t>
+            </a:r>
+          </a:p>
+          <a:p>
+            <a:pPr marL="0" indent="0">
+              <a:buNone/>
+            </a:pPr>
+            <a:endParaRPr lang="en-US" dirty="0"/>
+          </a:p>
+          <a:p>
+            <a:r>
+              <a:rPr lang="en-US" dirty="0"/>
               <a:t>Controlling errors</a:t>
             </a:r>
           </a:p>
           <a:p>
             <a:pPr lvl="1"/>
             <a:r>
-              <a:rPr lang="en-US"/>
+              <a:rPr lang="en-US" dirty="0"/>
               <a:t>Type I: FP</a:t>
             </a:r>
           </a:p>
           <a:p>
             <a:pPr lvl="2"/>
             <a:r>
-              <a:rPr lang="en-US"/>
+              <a:rPr lang="en-US" dirty="0"/>
               <a:t>Negative controls: should have minimal or no effect</a:t>
             </a:r>
           </a:p>
           <a:p>
             <a:pPr lvl="1"/>
             <a:r>
-              <a:rPr lang="en-US"/>
+              <a:rPr lang="en-US" dirty="0"/>
               <a:t>Type II: FN</a:t>
             </a:r>
           </a:p>
           <a:p>
             <a:pPr lvl="2"/>
             <a:r>
-              <a:rPr lang="en-US"/>
+              <a:rPr lang="en-US" dirty="0"/>
               <a:t>Positive controls: known effect</a:t>
             </a:r>
           </a:p>
           <a:p>
             <a:r>
-              <a:rPr lang="en-US"/>
+              <a:rPr lang="en-US" dirty="0"/>
               <a:t>Technical controls</a:t>
             </a:r>
           </a:p>
           <a:p>
             <a:pPr lvl="1"/>
             <a:r>
-              <a:rPr lang="en-US"/>
+              <a:rPr lang="en-US" dirty="0"/>
               <a:t>Detect/correct technical biases</a:t>
             </a:r>
           </a:p>
           <a:p>
             <a:pPr lvl="1"/>
             <a:r>
-              <a:rPr lang="en-US"/>
-              <a:t>Normalise measurements (quantification)</a:t>
-            </a:r>
-            <a:endParaRPr lang="en-US" dirty="0"/>
+              <a:rPr lang="en-US" dirty="0" err="1"/>
+              <a:t>Normalise</a:t>
+            </a:r>
+            <a:r>
+              <a:rPr lang="en-US" dirty="0"/>
+              <a:t> measurements (quantification)</a:t>
+            </a:r>
           </a:p>
         </p:txBody>
       </p:sp>
@@ -15530,12 +15564,20 @@
               <a:t>Menti</a:t>
             </a:r>
             <a:r>
+              <a:rPr lang="en-US" sz="3000">
+                <a:solidFill>
+                  <a:schemeClr val="tx2"/>
+                </a:solidFill>
+              </a:rPr>
+              <a:t> 31 06 96 7 when </a:t>
+            </a:r>
+            <a:r>
               <a:rPr lang="en-US" sz="3000" dirty="0">
                 <a:solidFill>
                   <a:schemeClr val="tx2"/>
                 </a:solidFill>
               </a:rPr>
-              <a:t> 55 29 55 when you return</a:t>
+              <a:t>you return</a:t>
             </a:r>
           </a:p>
         </p:txBody>

</xml_diff>